<commit_message>
Writing new Batch tutorial
</commit_message>
<xml_diff>
--- a/msoffice/BatchProcessingDiagrams.pptx
+++ b/msoffice/BatchProcessingDiagrams.pptx
@@ -8,6 +8,9 @@
     <p:sldId id="257" r:id="rId2"/>
     <p:sldId id="256" r:id="rId3"/>
     <p:sldId id="258" r:id="rId4"/>
+    <p:sldId id="259" r:id="rId5"/>
+    <p:sldId id="260" r:id="rId6"/>
+    <p:sldId id="261" r:id="rId7"/>
   </p:sldIdLst>
   <p:sldSz cx="12192000" cy="6858000"/>
   <p:notesSz cx="6858000" cy="9144000"/>
@@ -744,7 +747,7 @@
           <a:p>
             <a:fld id="{F0C111CB-F332-46EC-8F18-6087BDB51D59}" type="datetimeFigureOut">
               <a:rPr lang="en-GB" smtClean="0"/>
-              <a:t>02/06/2024</a:t>
+              <a:t>26/01/2025</a:t>
             </a:fld>
             <a:endParaRPr lang="en-GB"/>
           </a:p>
@@ -942,7 +945,7 @@
           <a:p>
             <a:fld id="{F0C111CB-F332-46EC-8F18-6087BDB51D59}" type="datetimeFigureOut">
               <a:rPr lang="en-GB" smtClean="0"/>
-              <a:t>02/06/2024</a:t>
+              <a:t>26/01/2025</a:t>
             </a:fld>
             <a:endParaRPr lang="en-GB"/>
           </a:p>
@@ -1150,7 +1153,7 @@
           <a:p>
             <a:fld id="{F0C111CB-F332-46EC-8F18-6087BDB51D59}" type="datetimeFigureOut">
               <a:rPr lang="en-GB" smtClean="0"/>
-              <a:t>02/06/2024</a:t>
+              <a:t>26/01/2025</a:t>
             </a:fld>
             <a:endParaRPr lang="en-GB"/>
           </a:p>
@@ -1348,7 +1351,7 @@
           <a:p>
             <a:fld id="{F0C111CB-F332-46EC-8F18-6087BDB51D59}" type="datetimeFigureOut">
               <a:rPr lang="en-GB" smtClean="0"/>
-              <a:t>02/06/2024</a:t>
+              <a:t>26/01/2025</a:t>
             </a:fld>
             <a:endParaRPr lang="en-GB"/>
           </a:p>
@@ -1623,7 +1626,7 @@
           <a:p>
             <a:fld id="{F0C111CB-F332-46EC-8F18-6087BDB51D59}" type="datetimeFigureOut">
               <a:rPr lang="en-GB" smtClean="0"/>
-              <a:t>02/06/2024</a:t>
+              <a:t>26/01/2025</a:t>
             </a:fld>
             <a:endParaRPr lang="en-GB"/>
           </a:p>
@@ -1888,7 +1891,7 @@
           <a:p>
             <a:fld id="{F0C111CB-F332-46EC-8F18-6087BDB51D59}" type="datetimeFigureOut">
               <a:rPr lang="en-GB" smtClean="0"/>
-              <a:t>02/06/2024</a:t>
+              <a:t>26/01/2025</a:t>
             </a:fld>
             <a:endParaRPr lang="en-GB"/>
           </a:p>
@@ -2300,7 +2303,7 @@
           <a:p>
             <a:fld id="{F0C111CB-F332-46EC-8F18-6087BDB51D59}" type="datetimeFigureOut">
               <a:rPr lang="en-GB" smtClean="0"/>
-              <a:t>02/06/2024</a:t>
+              <a:t>26/01/2025</a:t>
             </a:fld>
             <a:endParaRPr lang="en-GB"/>
           </a:p>
@@ -2441,7 +2444,7 @@
           <a:p>
             <a:fld id="{F0C111CB-F332-46EC-8F18-6087BDB51D59}" type="datetimeFigureOut">
               <a:rPr lang="en-GB" smtClean="0"/>
-              <a:t>02/06/2024</a:t>
+              <a:t>26/01/2025</a:t>
             </a:fld>
             <a:endParaRPr lang="en-GB"/>
           </a:p>
@@ -2554,7 +2557,7 @@
           <a:p>
             <a:fld id="{F0C111CB-F332-46EC-8F18-6087BDB51D59}" type="datetimeFigureOut">
               <a:rPr lang="en-GB" smtClean="0"/>
-              <a:t>02/06/2024</a:t>
+              <a:t>26/01/2025</a:t>
             </a:fld>
             <a:endParaRPr lang="en-GB"/>
           </a:p>
@@ -2865,7 +2868,7 @@
           <a:p>
             <a:fld id="{F0C111CB-F332-46EC-8F18-6087BDB51D59}" type="datetimeFigureOut">
               <a:rPr lang="en-GB" smtClean="0"/>
-              <a:t>02/06/2024</a:t>
+              <a:t>26/01/2025</a:t>
             </a:fld>
             <a:endParaRPr lang="en-GB"/>
           </a:p>
@@ -3153,7 +3156,7 @@
           <a:p>
             <a:fld id="{F0C111CB-F332-46EC-8F18-6087BDB51D59}" type="datetimeFigureOut">
               <a:rPr lang="en-GB" smtClean="0"/>
-              <a:t>02/06/2024</a:t>
+              <a:t>26/01/2025</a:t>
             </a:fld>
             <a:endParaRPr lang="en-GB"/>
           </a:p>
@@ -3394,7 +3397,7 @@
           <a:p>
             <a:fld id="{F0C111CB-F332-46EC-8F18-6087BDB51D59}" type="datetimeFigureOut">
               <a:rPr lang="en-GB" smtClean="0"/>
-              <a:t>02/06/2024</a:t>
+              <a:t>26/01/2025</a:t>
             </a:fld>
             <a:endParaRPr lang="en-GB"/>
           </a:p>
@@ -5632,6 +5635,1741 @@
     <p:extLst>
       <p:ext uri="{BB962C8B-B14F-4D97-AF65-F5344CB8AC3E}">
         <p14:creationId xmlns:p14="http://schemas.microsoft.com/office/powerpoint/2010/main" val="2646766590"/>
+      </p:ext>
+    </p:extLst>
+  </p:cSld>
+  <p:clrMapOvr>
+    <a:masterClrMapping/>
+  </p:clrMapOvr>
+</p:sld>
+</file>
+
+<file path=ppt/slides/slide4.xml><?xml version="1.0" encoding="utf-8"?>
+<p:sld xmlns:a="http://schemas.openxmlformats.org/drawingml/2006/main" xmlns:r="http://schemas.openxmlformats.org/officeDocument/2006/relationships" xmlns:p="http://schemas.openxmlformats.org/presentationml/2006/main">
+  <p:cSld>
+    <p:spTree>
+      <p:nvGrpSpPr>
+        <p:cNvPr id="1" name=""/>
+        <p:cNvGrpSpPr/>
+        <p:nvPr/>
+      </p:nvGrpSpPr>
+      <p:grpSpPr>
+        <a:xfrm>
+          <a:off x="0" y="0"/>
+          <a:ext cx="0" cy="0"/>
+          <a:chOff x="0" y="0"/>
+          <a:chExt cx="0" cy="0"/>
+        </a:xfrm>
+      </p:grpSpPr>
+      <p:sp>
+        <p:nvSpPr>
+          <p:cNvPr id="5" name="Rectangle 4">
+            <a:extLst>
+              <a:ext uri="{FF2B5EF4-FFF2-40B4-BE49-F238E27FC236}">
+                <a16:creationId xmlns:a16="http://schemas.microsoft.com/office/drawing/2014/main" id="{E9BA1D5C-061E-D5A0-8BCC-91B41338D208}"/>
+              </a:ext>
+            </a:extLst>
+          </p:cNvPr>
+          <p:cNvSpPr/>
+          <p:nvPr/>
+        </p:nvSpPr>
+        <p:spPr>
+          <a:xfrm>
+            <a:off x="697118" y="1158844"/>
+            <a:ext cx="1620569" cy="760491"/>
+          </a:xfrm>
+          <a:prstGeom prst="rect">
+            <a:avLst/>
+          </a:prstGeom>
+          <a:solidFill>
+            <a:schemeClr val="bg1"/>
+          </a:solidFill>
+          <a:ln>
+            <a:solidFill>
+              <a:schemeClr val="tx1"/>
+            </a:solidFill>
+          </a:ln>
+        </p:spPr>
+        <p:style>
+          <a:lnRef idx="2">
+            <a:schemeClr val="accent1">
+              <a:shade val="15000"/>
+            </a:schemeClr>
+          </a:lnRef>
+          <a:fillRef idx="1">
+            <a:schemeClr val="accent1"/>
+          </a:fillRef>
+          <a:effectRef idx="0">
+            <a:schemeClr val="accent1"/>
+          </a:effectRef>
+          <a:fontRef idx="minor">
+            <a:schemeClr val="lt1"/>
+          </a:fontRef>
+        </p:style>
+        <p:txBody>
+          <a:bodyPr rtlCol="0" anchor="ctr"/>
+          <a:lstStyle/>
+          <a:p>
+            <a:pPr algn="ctr"/>
+            <a:r>
+              <a:rPr lang="en-GB" sz="1200" dirty="0">
+                <a:solidFill>
+                  <a:schemeClr val="tx1"/>
+                </a:solidFill>
+              </a:rPr>
+              <a:t>Raw Audio Data sampled at 384kHz</a:t>
+            </a:r>
+          </a:p>
+        </p:txBody>
+      </p:sp>
+      <p:sp>
+        <p:nvSpPr>
+          <p:cNvPr id="6" name="Rectangle 5">
+            <a:extLst>
+              <a:ext uri="{FF2B5EF4-FFF2-40B4-BE49-F238E27FC236}">
+                <a16:creationId xmlns:a16="http://schemas.microsoft.com/office/drawing/2014/main" id="{7A4FC4B6-2563-87D2-442F-7B3205C8EE0D}"/>
+              </a:ext>
+            </a:extLst>
+          </p:cNvPr>
+          <p:cNvSpPr/>
+          <p:nvPr/>
+        </p:nvSpPr>
+        <p:spPr>
+          <a:xfrm>
+            <a:off x="2662475" y="1158844"/>
+            <a:ext cx="1429691" cy="760491"/>
+          </a:xfrm>
+          <a:prstGeom prst="rect">
+            <a:avLst/>
+          </a:prstGeom>
+          <a:solidFill>
+            <a:schemeClr val="bg1"/>
+          </a:solidFill>
+          <a:ln>
+            <a:solidFill>
+              <a:schemeClr val="tx1"/>
+            </a:solidFill>
+          </a:ln>
+        </p:spPr>
+        <p:style>
+          <a:lnRef idx="2">
+            <a:schemeClr val="accent1">
+              <a:shade val="15000"/>
+            </a:schemeClr>
+          </a:lnRef>
+          <a:fillRef idx="1">
+            <a:schemeClr val="accent1"/>
+          </a:fillRef>
+          <a:effectRef idx="0">
+            <a:schemeClr val="accent1"/>
+          </a:effectRef>
+          <a:fontRef idx="minor">
+            <a:schemeClr val="lt1"/>
+          </a:fontRef>
+        </p:style>
+        <p:txBody>
+          <a:bodyPr rtlCol="0" anchor="ctr"/>
+          <a:lstStyle/>
+          <a:p>
+            <a:pPr algn="ctr"/>
+            <a:r>
+              <a:rPr lang="en-GB" sz="1200" dirty="0">
+                <a:solidFill>
+                  <a:schemeClr val="tx1"/>
+                </a:solidFill>
+              </a:rPr>
+              <a:t>Automatic Click Detector</a:t>
+            </a:r>
+          </a:p>
+        </p:txBody>
+      </p:sp>
+      <p:sp>
+        <p:nvSpPr>
+          <p:cNvPr id="7" name="Rectangle 6">
+            <a:extLst>
+              <a:ext uri="{FF2B5EF4-FFF2-40B4-BE49-F238E27FC236}">
+                <a16:creationId xmlns:a16="http://schemas.microsoft.com/office/drawing/2014/main" id="{26EC53BD-BF24-1EE3-80CB-7BB1622A3FAA}"/>
+              </a:ext>
+            </a:extLst>
+          </p:cNvPr>
+          <p:cNvSpPr/>
+          <p:nvPr/>
+        </p:nvSpPr>
+        <p:spPr>
+          <a:xfrm>
+            <a:off x="4436955" y="1158844"/>
+            <a:ext cx="1311996" cy="760491"/>
+          </a:xfrm>
+          <a:prstGeom prst="rect">
+            <a:avLst/>
+          </a:prstGeom>
+          <a:solidFill>
+            <a:schemeClr val="bg1"/>
+          </a:solidFill>
+          <a:ln>
+            <a:solidFill>
+              <a:schemeClr val="tx1"/>
+            </a:solidFill>
+          </a:ln>
+        </p:spPr>
+        <p:style>
+          <a:lnRef idx="2">
+            <a:schemeClr val="accent1">
+              <a:shade val="15000"/>
+            </a:schemeClr>
+          </a:lnRef>
+          <a:fillRef idx="1">
+            <a:schemeClr val="accent1"/>
+          </a:fillRef>
+          <a:effectRef idx="0">
+            <a:schemeClr val="accent1"/>
+          </a:effectRef>
+          <a:fontRef idx="minor">
+            <a:schemeClr val="lt1"/>
+          </a:fontRef>
+        </p:style>
+        <p:txBody>
+          <a:bodyPr rtlCol="0" anchor="ctr"/>
+          <a:lstStyle/>
+          <a:p>
+            <a:pPr algn="ctr"/>
+            <a:r>
+              <a:rPr lang="en-GB" sz="1200" dirty="0">
+                <a:solidFill>
+                  <a:schemeClr val="tx1"/>
+                </a:solidFill>
+              </a:rPr>
+              <a:t>1ms clips of Transient Detections</a:t>
+            </a:r>
+          </a:p>
+        </p:txBody>
+      </p:sp>
+      <p:sp>
+        <p:nvSpPr>
+          <p:cNvPr id="8" name="Rectangle 7">
+            <a:extLst>
+              <a:ext uri="{FF2B5EF4-FFF2-40B4-BE49-F238E27FC236}">
+                <a16:creationId xmlns:a16="http://schemas.microsoft.com/office/drawing/2014/main" id="{BDDD3959-0AF0-BC69-84A2-7B597B9076FB}"/>
+              </a:ext>
+            </a:extLst>
+          </p:cNvPr>
+          <p:cNvSpPr/>
+          <p:nvPr/>
+        </p:nvSpPr>
+        <p:spPr>
+          <a:xfrm>
+            <a:off x="2692653" y="2112475"/>
+            <a:ext cx="1399513" cy="760491"/>
+          </a:xfrm>
+          <a:prstGeom prst="rect">
+            <a:avLst/>
+          </a:prstGeom>
+          <a:solidFill>
+            <a:schemeClr val="bg1"/>
+          </a:solidFill>
+          <a:ln>
+            <a:solidFill>
+              <a:schemeClr val="tx1"/>
+            </a:solidFill>
+          </a:ln>
+        </p:spPr>
+        <p:style>
+          <a:lnRef idx="2">
+            <a:schemeClr val="accent1">
+              <a:shade val="15000"/>
+            </a:schemeClr>
+          </a:lnRef>
+          <a:fillRef idx="1">
+            <a:schemeClr val="accent1"/>
+          </a:fillRef>
+          <a:effectRef idx="0">
+            <a:schemeClr val="accent1"/>
+          </a:effectRef>
+          <a:fontRef idx="minor">
+            <a:schemeClr val="lt1"/>
+          </a:fontRef>
+        </p:style>
+        <p:txBody>
+          <a:bodyPr rtlCol="0" anchor="ctr"/>
+          <a:lstStyle/>
+          <a:p>
+            <a:pPr algn="ctr"/>
+            <a:r>
+              <a:rPr lang="en-GB" sz="1200" dirty="0">
+                <a:solidFill>
+                  <a:schemeClr val="tx1"/>
+                </a:solidFill>
+              </a:rPr>
+              <a:t>Decimate to 96kHz</a:t>
+            </a:r>
+          </a:p>
+        </p:txBody>
+      </p:sp>
+      <p:sp>
+        <p:nvSpPr>
+          <p:cNvPr id="9" name="Rectangle 8">
+            <a:extLst>
+              <a:ext uri="{FF2B5EF4-FFF2-40B4-BE49-F238E27FC236}">
+                <a16:creationId xmlns:a16="http://schemas.microsoft.com/office/drawing/2014/main" id="{3ED450BE-2BE1-871B-66DE-1C9F9D92CE32}"/>
+              </a:ext>
+            </a:extLst>
+          </p:cNvPr>
+          <p:cNvSpPr/>
+          <p:nvPr/>
+        </p:nvSpPr>
+        <p:spPr>
+          <a:xfrm>
+            <a:off x="4436956" y="2112475"/>
+            <a:ext cx="1311996" cy="760491"/>
+          </a:xfrm>
+          <a:prstGeom prst="rect">
+            <a:avLst/>
+          </a:prstGeom>
+          <a:solidFill>
+            <a:schemeClr val="bg1"/>
+          </a:solidFill>
+          <a:ln>
+            <a:solidFill>
+              <a:schemeClr val="tx1"/>
+            </a:solidFill>
+          </a:ln>
+        </p:spPr>
+        <p:style>
+          <a:lnRef idx="2">
+            <a:schemeClr val="accent1">
+              <a:shade val="15000"/>
+            </a:schemeClr>
+          </a:lnRef>
+          <a:fillRef idx="1">
+            <a:schemeClr val="accent1"/>
+          </a:fillRef>
+          <a:effectRef idx="0">
+            <a:schemeClr val="accent1"/>
+          </a:effectRef>
+          <a:fontRef idx="minor">
+            <a:schemeClr val="lt1"/>
+          </a:fontRef>
+        </p:style>
+        <p:txBody>
+          <a:bodyPr rtlCol="0" anchor="ctr"/>
+          <a:lstStyle/>
+          <a:p>
+            <a:pPr algn="ctr"/>
+            <a:r>
+              <a:rPr lang="en-GB" sz="1200" dirty="0">
+                <a:solidFill>
+                  <a:schemeClr val="tx1"/>
+                </a:solidFill>
+              </a:rPr>
+              <a:t>Recording 96kHz data</a:t>
+            </a:r>
+          </a:p>
+        </p:txBody>
+      </p:sp>
+      <p:sp>
+        <p:nvSpPr>
+          <p:cNvPr id="10" name="Rectangle 9">
+            <a:extLst>
+              <a:ext uri="{FF2B5EF4-FFF2-40B4-BE49-F238E27FC236}">
+                <a16:creationId xmlns:a16="http://schemas.microsoft.com/office/drawing/2014/main" id="{95918CB4-18DF-8A81-14E8-0F2639B8DA5C}"/>
+              </a:ext>
+            </a:extLst>
+          </p:cNvPr>
+          <p:cNvSpPr/>
+          <p:nvPr/>
+        </p:nvSpPr>
+        <p:spPr>
+          <a:xfrm>
+            <a:off x="6093740" y="1167894"/>
+            <a:ext cx="725787" cy="1714124"/>
+          </a:xfrm>
+          <a:prstGeom prst="rect">
+            <a:avLst/>
+          </a:prstGeom>
+          <a:solidFill>
+            <a:schemeClr val="bg1"/>
+          </a:solidFill>
+          <a:ln>
+            <a:solidFill>
+              <a:schemeClr val="tx1"/>
+            </a:solidFill>
+          </a:ln>
+        </p:spPr>
+        <p:style>
+          <a:lnRef idx="2">
+            <a:schemeClr val="accent1">
+              <a:shade val="15000"/>
+            </a:schemeClr>
+          </a:lnRef>
+          <a:fillRef idx="1">
+            <a:schemeClr val="accent1"/>
+          </a:fillRef>
+          <a:effectRef idx="0">
+            <a:schemeClr val="accent1"/>
+          </a:effectRef>
+          <a:fontRef idx="minor">
+            <a:schemeClr val="lt1"/>
+          </a:fontRef>
+        </p:style>
+        <p:txBody>
+          <a:bodyPr vert="vert270" rtlCol="0" anchor="ctr"/>
+          <a:lstStyle/>
+          <a:p>
+            <a:pPr algn="ctr"/>
+            <a:r>
+              <a:rPr lang="en-GB" sz="1200" dirty="0">
+                <a:solidFill>
+                  <a:schemeClr val="tx1"/>
+                </a:solidFill>
+              </a:rPr>
+              <a:t>Lossless Compression</a:t>
+            </a:r>
+          </a:p>
+        </p:txBody>
+      </p:sp>
+      <p:sp>
+        <p:nvSpPr>
+          <p:cNvPr id="11" name="Rectangle 10">
+            <a:extLst>
+              <a:ext uri="{FF2B5EF4-FFF2-40B4-BE49-F238E27FC236}">
+                <a16:creationId xmlns:a16="http://schemas.microsoft.com/office/drawing/2014/main" id="{5F252399-1B17-41BA-B724-C11CCCB2388C}"/>
+              </a:ext>
+            </a:extLst>
+          </p:cNvPr>
+          <p:cNvSpPr/>
+          <p:nvPr/>
+        </p:nvSpPr>
+        <p:spPr>
+          <a:xfrm>
+            <a:off x="7142432" y="1176946"/>
+            <a:ext cx="725787" cy="1714125"/>
+          </a:xfrm>
+          <a:prstGeom prst="rect">
+            <a:avLst/>
+          </a:prstGeom>
+          <a:solidFill>
+            <a:schemeClr val="bg1"/>
+          </a:solidFill>
+          <a:ln>
+            <a:solidFill>
+              <a:schemeClr val="tx1"/>
+            </a:solidFill>
+          </a:ln>
+        </p:spPr>
+        <p:style>
+          <a:lnRef idx="2">
+            <a:schemeClr val="accent1">
+              <a:shade val="15000"/>
+            </a:schemeClr>
+          </a:lnRef>
+          <a:fillRef idx="1">
+            <a:schemeClr val="accent1"/>
+          </a:fillRef>
+          <a:effectRef idx="0">
+            <a:schemeClr val="accent1"/>
+          </a:effectRef>
+          <a:fontRef idx="minor">
+            <a:schemeClr val="lt1"/>
+          </a:fontRef>
+        </p:style>
+        <p:txBody>
+          <a:bodyPr vert="vert270" rtlCol="0" anchor="ctr"/>
+          <a:lstStyle/>
+          <a:p>
+            <a:pPr algn="ctr"/>
+            <a:r>
+              <a:rPr lang="en-GB" sz="1200" dirty="0">
+                <a:solidFill>
+                  <a:schemeClr val="tx1"/>
+                </a:solidFill>
+              </a:rPr>
+              <a:t>SUD File Storage</a:t>
+            </a:r>
+          </a:p>
+        </p:txBody>
+      </p:sp>
+      <p:cxnSp>
+        <p:nvCxnSpPr>
+          <p:cNvPr id="13" name="Connector: Elbow 12">
+            <a:extLst>
+              <a:ext uri="{FF2B5EF4-FFF2-40B4-BE49-F238E27FC236}">
+                <a16:creationId xmlns:a16="http://schemas.microsoft.com/office/drawing/2014/main" id="{C627A1A2-C577-8ED6-4D62-92643D73C219}"/>
+              </a:ext>
+            </a:extLst>
+          </p:cNvPr>
+          <p:cNvCxnSpPr>
+            <a:cxnSpLocks/>
+          </p:cNvCxnSpPr>
+          <p:nvPr/>
+        </p:nvCxnSpPr>
+        <p:spPr>
+          <a:xfrm>
+            <a:off x="2317687" y="1532739"/>
+            <a:ext cx="344788" cy="12700"/>
+          </a:xfrm>
+          <a:prstGeom prst="bentConnector3">
+            <a:avLst/>
+          </a:prstGeom>
+          <a:ln>
+            <a:solidFill>
+              <a:schemeClr val="tx1"/>
+            </a:solidFill>
+            <a:tailEnd type="triangle"/>
+          </a:ln>
+        </p:spPr>
+        <p:style>
+          <a:lnRef idx="2">
+            <a:schemeClr val="accent1"/>
+          </a:lnRef>
+          <a:fillRef idx="0">
+            <a:schemeClr val="accent1"/>
+          </a:fillRef>
+          <a:effectRef idx="1">
+            <a:schemeClr val="accent1"/>
+          </a:effectRef>
+          <a:fontRef idx="minor">
+            <a:schemeClr val="tx1"/>
+          </a:fontRef>
+        </p:style>
+      </p:cxnSp>
+      <p:cxnSp>
+        <p:nvCxnSpPr>
+          <p:cNvPr id="14" name="Connector: Elbow 13">
+            <a:extLst>
+              <a:ext uri="{FF2B5EF4-FFF2-40B4-BE49-F238E27FC236}">
+                <a16:creationId xmlns:a16="http://schemas.microsoft.com/office/drawing/2014/main" id="{052D18D5-D212-24AF-C227-C9391B6988A0}"/>
+              </a:ext>
+            </a:extLst>
+          </p:cNvPr>
+          <p:cNvCxnSpPr>
+            <a:cxnSpLocks/>
+            <a:stCxn id="6" idx="3"/>
+            <a:endCxn id="7" idx="1"/>
+          </p:cNvCxnSpPr>
+          <p:nvPr/>
+        </p:nvCxnSpPr>
+        <p:spPr>
+          <a:xfrm>
+            <a:off x="4092166" y="1539090"/>
+            <a:ext cx="344789" cy="12700"/>
+          </a:xfrm>
+          <a:prstGeom prst="bentConnector3">
+            <a:avLst>
+              <a:gd name="adj1" fmla="val 50000"/>
+            </a:avLst>
+          </a:prstGeom>
+          <a:ln>
+            <a:solidFill>
+              <a:schemeClr val="tx1"/>
+            </a:solidFill>
+            <a:tailEnd type="triangle"/>
+          </a:ln>
+        </p:spPr>
+        <p:style>
+          <a:lnRef idx="2">
+            <a:schemeClr val="accent1"/>
+          </a:lnRef>
+          <a:fillRef idx="0">
+            <a:schemeClr val="accent1"/>
+          </a:fillRef>
+          <a:effectRef idx="1">
+            <a:schemeClr val="accent1"/>
+          </a:effectRef>
+          <a:fontRef idx="minor">
+            <a:schemeClr val="tx1"/>
+          </a:fontRef>
+        </p:style>
+      </p:cxnSp>
+      <p:cxnSp>
+        <p:nvCxnSpPr>
+          <p:cNvPr id="15" name="Connector: Elbow 14">
+            <a:extLst>
+              <a:ext uri="{FF2B5EF4-FFF2-40B4-BE49-F238E27FC236}">
+                <a16:creationId xmlns:a16="http://schemas.microsoft.com/office/drawing/2014/main" id="{00D1CF0D-FEEE-A027-578D-A0BE80A3368B}"/>
+              </a:ext>
+            </a:extLst>
+          </p:cNvPr>
+          <p:cNvCxnSpPr>
+            <a:cxnSpLocks/>
+            <a:stCxn id="5" idx="3"/>
+            <a:endCxn id="8" idx="1"/>
+          </p:cNvCxnSpPr>
+          <p:nvPr/>
+        </p:nvCxnSpPr>
+        <p:spPr>
+          <a:xfrm>
+            <a:off x="2317687" y="1539090"/>
+            <a:ext cx="374966" cy="953631"/>
+          </a:xfrm>
+          <a:prstGeom prst="bentConnector3">
+            <a:avLst/>
+          </a:prstGeom>
+          <a:ln>
+            <a:solidFill>
+              <a:schemeClr val="tx1"/>
+            </a:solidFill>
+            <a:tailEnd type="triangle"/>
+          </a:ln>
+        </p:spPr>
+        <p:style>
+          <a:lnRef idx="2">
+            <a:schemeClr val="accent1"/>
+          </a:lnRef>
+          <a:fillRef idx="0">
+            <a:schemeClr val="accent1"/>
+          </a:fillRef>
+          <a:effectRef idx="1">
+            <a:schemeClr val="accent1"/>
+          </a:effectRef>
+          <a:fontRef idx="minor">
+            <a:schemeClr val="tx1"/>
+          </a:fontRef>
+        </p:style>
+      </p:cxnSp>
+      <p:cxnSp>
+        <p:nvCxnSpPr>
+          <p:cNvPr id="16" name="Connector: Elbow 15">
+            <a:extLst>
+              <a:ext uri="{FF2B5EF4-FFF2-40B4-BE49-F238E27FC236}">
+                <a16:creationId xmlns:a16="http://schemas.microsoft.com/office/drawing/2014/main" id="{DB89286F-A3A7-E49C-5EAA-70A48C52A4F4}"/>
+              </a:ext>
+            </a:extLst>
+          </p:cNvPr>
+          <p:cNvCxnSpPr>
+            <a:cxnSpLocks/>
+            <a:stCxn id="8" idx="3"/>
+            <a:endCxn id="9" idx="1"/>
+          </p:cNvCxnSpPr>
+          <p:nvPr/>
+        </p:nvCxnSpPr>
+        <p:spPr>
+          <a:xfrm>
+            <a:off x="4092166" y="2492721"/>
+            <a:ext cx="344790" cy="12700"/>
+          </a:xfrm>
+          <a:prstGeom prst="bentConnector3">
+            <a:avLst/>
+          </a:prstGeom>
+          <a:ln>
+            <a:solidFill>
+              <a:schemeClr val="tx1"/>
+            </a:solidFill>
+            <a:tailEnd type="triangle"/>
+          </a:ln>
+        </p:spPr>
+        <p:style>
+          <a:lnRef idx="2">
+            <a:schemeClr val="accent1"/>
+          </a:lnRef>
+          <a:fillRef idx="0">
+            <a:schemeClr val="accent1"/>
+          </a:fillRef>
+          <a:effectRef idx="1">
+            <a:schemeClr val="accent1"/>
+          </a:effectRef>
+          <a:fontRef idx="minor">
+            <a:schemeClr val="tx1"/>
+          </a:fontRef>
+        </p:style>
+      </p:cxnSp>
+      <p:cxnSp>
+        <p:nvCxnSpPr>
+          <p:cNvPr id="17" name="Connector: Elbow 16">
+            <a:extLst>
+              <a:ext uri="{FF2B5EF4-FFF2-40B4-BE49-F238E27FC236}">
+                <a16:creationId xmlns:a16="http://schemas.microsoft.com/office/drawing/2014/main" id="{62C0AC1C-4334-0B95-3548-F53FB9846EFC}"/>
+              </a:ext>
+            </a:extLst>
+          </p:cNvPr>
+          <p:cNvCxnSpPr>
+            <a:cxnSpLocks/>
+            <a:stCxn id="7" idx="3"/>
+            <a:endCxn id="10" idx="1"/>
+          </p:cNvCxnSpPr>
+          <p:nvPr/>
+        </p:nvCxnSpPr>
+        <p:spPr>
+          <a:xfrm>
+            <a:off x="5748951" y="1539090"/>
+            <a:ext cx="344789" cy="485866"/>
+          </a:xfrm>
+          <a:prstGeom prst="bentConnector3">
+            <a:avLst/>
+          </a:prstGeom>
+          <a:ln>
+            <a:solidFill>
+              <a:schemeClr val="tx1"/>
+            </a:solidFill>
+            <a:tailEnd type="triangle"/>
+          </a:ln>
+        </p:spPr>
+        <p:style>
+          <a:lnRef idx="2">
+            <a:schemeClr val="accent1"/>
+          </a:lnRef>
+          <a:fillRef idx="0">
+            <a:schemeClr val="accent1"/>
+          </a:fillRef>
+          <a:effectRef idx="1">
+            <a:schemeClr val="accent1"/>
+          </a:effectRef>
+          <a:fontRef idx="minor">
+            <a:schemeClr val="tx1"/>
+          </a:fontRef>
+        </p:style>
+      </p:cxnSp>
+      <p:cxnSp>
+        <p:nvCxnSpPr>
+          <p:cNvPr id="27" name="Connector: Elbow 26">
+            <a:extLst>
+              <a:ext uri="{FF2B5EF4-FFF2-40B4-BE49-F238E27FC236}">
+                <a16:creationId xmlns:a16="http://schemas.microsoft.com/office/drawing/2014/main" id="{5F3750EF-F20E-3E52-1831-BE919F29123D}"/>
+              </a:ext>
+            </a:extLst>
+          </p:cNvPr>
+          <p:cNvCxnSpPr>
+            <a:cxnSpLocks/>
+            <a:stCxn id="9" idx="3"/>
+            <a:endCxn id="10" idx="1"/>
+          </p:cNvCxnSpPr>
+          <p:nvPr/>
+        </p:nvCxnSpPr>
+        <p:spPr>
+          <a:xfrm flipV="1">
+            <a:off x="5748952" y="2024956"/>
+            <a:ext cx="344788" cy="467765"/>
+          </a:xfrm>
+          <a:prstGeom prst="bentConnector3">
+            <a:avLst>
+              <a:gd name="adj1" fmla="val 50000"/>
+            </a:avLst>
+          </a:prstGeom>
+          <a:ln>
+            <a:solidFill>
+              <a:schemeClr val="tx1"/>
+            </a:solidFill>
+            <a:tailEnd type="triangle"/>
+          </a:ln>
+        </p:spPr>
+        <p:style>
+          <a:lnRef idx="2">
+            <a:schemeClr val="accent1"/>
+          </a:lnRef>
+          <a:fillRef idx="0">
+            <a:schemeClr val="accent1"/>
+          </a:fillRef>
+          <a:effectRef idx="1">
+            <a:schemeClr val="accent1"/>
+          </a:effectRef>
+          <a:fontRef idx="minor">
+            <a:schemeClr val="tx1"/>
+          </a:fontRef>
+        </p:style>
+      </p:cxnSp>
+      <p:cxnSp>
+        <p:nvCxnSpPr>
+          <p:cNvPr id="31" name="Connector: Elbow 30">
+            <a:extLst>
+              <a:ext uri="{FF2B5EF4-FFF2-40B4-BE49-F238E27FC236}">
+                <a16:creationId xmlns:a16="http://schemas.microsoft.com/office/drawing/2014/main" id="{AEB714F7-FA39-9ED4-3643-BA9AAE845A2B}"/>
+              </a:ext>
+            </a:extLst>
+          </p:cNvPr>
+          <p:cNvCxnSpPr>
+            <a:cxnSpLocks/>
+            <a:stCxn id="10" idx="3"/>
+            <a:endCxn id="11" idx="1"/>
+          </p:cNvCxnSpPr>
+          <p:nvPr/>
+        </p:nvCxnSpPr>
+        <p:spPr>
+          <a:xfrm>
+            <a:off x="6819527" y="2024956"/>
+            <a:ext cx="322905" cy="9053"/>
+          </a:xfrm>
+          <a:prstGeom prst="bentConnector3">
+            <a:avLst>
+              <a:gd name="adj1" fmla="val 50000"/>
+            </a:avLst>
+          </a:prstGeom>
+          <a:ln>
+            <a:solidFill>
+              <a:schemeClr val="tx1"/>
+            </a:solidFill>
+            <a:tailEnd type="triangle"/>
+          </a:ln>
+        </p:spPr>
+        <p:style>
+          <a:lnRef idx="2">
+            <a:schemeClr val="accent1"/>
+          </a:lnRef>
+          <a:fillRef idx="0">
+            <a:schemeClr val="accent1"/>
+          </a:fillRef>
+          <a:effectRef idx="1">
+            <a:schemeClr val="accent1"/>
+          </a:effectRef>
+          <a:fontRef idx="minor">
+            <a:schemeClr val="tx1"/>
+          </a:fontRef>
+        </p:style>
+      </p:cxnSp>
+      <p:pic>
+        <p:nvPicPr>
+          <p:cNvPr id="35" name="Picture 34" descr="A close-up of a cylinder&#10;&#10;Description automatically generated">
+            <a:extLst>
+              <a:ext uri="{FF2B5EF4-FFF2-40B4-BE49-F238E27FC236}">
+                <a16:creationId xmlns:a16="http://schemas.microsoft.com/office/drawing/2014/main" id="{ABDEBC3C-7C8A-B719-0924-1B5CA063F5B2}"/>
+              </a:ext>
+            </a:extLst>
+          </p:cNvPr>
+          <p:cNvPicPr>
+            <a:picLocks noChangeAspect="1"/>
+          </p:cNvPicPr>
+          <p:nvPr/>
+        </p:nvPicPr>
+        <p:blipFill>
+          <a:blip r:embed="rId2">
+            <a:extLst>
+              <a:ext uri="{28A0092B-C50C-407E-A947-70E740481C1C}">
+                <a14:useLocalDpi xmlns:a14="http://schemas.microsoft.com/office/drawing/2010/main" val="0"/>
+              </a:ext>
+            </a:extLst>
+          </a:blip>
+          <a:srcRect l="45446" t="6795" r="47188" b="11194"/>
+          <a:stretch/>
+        </p:blipFill>
+        <p:spPr>
+          <a:xfrm rot="16200000">
+            <a:off x="3788126" y="-2043947"/>
+            <a:ext cx="760490" cy="5302312"/>
+          </a:xfrm>
+          <a:prstGeom prst="rect">
+            <a:avLst/>
+          </a:prstGeom>
+        </p:spPr>
+      </p:pic>
+    </p:spTree>
+    <p:extLst>
+      <p:ext uri="{BB962C8B-B14F-4D97-AF65-F5344CB8AC3E}">
+        <p14:creationId xmlns:p14="http://schemas.microsoft.com/office/powerpoint/2010/main" val="2945777510"/>
+      </p:ext>
+    </p:extLst>
+  </p:cSld>
+  <p:clrMapOvr>
+    <a:masterClrMapping/>
+  </p:clrMapOvr>
+</p:sld>
+</file>
+
+<file path=ppt/slides/slide5.xml><?xml version="1.0" encoding="utf-8"?>
+<p:sld xmlns:a="http://schemas.openxmlformats.org/drawingml/2006/main" xmlns:r="http://schemas.openxmlformats.org/officeDocument/2006/relationships" xmlns:p="http://schemas.openxmlformats.org/presentationml/2006/main">
+  <p:cSld>
+    <p:spTree>
+      <p:nvGrpSpPr>
+        <p:cNvPr id="1" name="">
+          <a:extLst>
+            <a:ext uri="{FF2B5EF4-FFF2-40B4-BE49-F238E27FC236}">
+              <a16:creationId xmlns:a16="http://schemas.microsoft.com/office/drawing/2014/main" id="{6500FB39-6D22-9DE2-4603-B3C08C28D3F6}"/>
+            </a:ext>
+          </a:extLst>
+        </p:cNvPr>
+        <p:cNvGrpSpPr/>
+        <p:nvPr/>
+      </p:nvGrpSpPr>
+      <p:grpSpPr>
+        <a:xfrm>
+          <a:off x="0" y="0"/>
+          <a:ext cx="0" cy="0"/>
+          <a:chOff x="0" y="0"/>
+          <a:chExt cx="0" cy="0"/>
+        </a:xfrm>
+      </p:grpSpPr>
+      <p:sp>
+        <p:nvSpPr>
+          <p:cNvPr id="5" name="Rectangle 4">
+            <a:extLst>
+              <a:ext uri="{FF2B5EF4-FFF2-40B4-BE49-F238E27FC236}">
+                <a16:creationId xmlns:a16="http://schemas.microsoft.com/office/drawing/2014/main" id="{C7A6EAB8-C73E-FF96-1425-1CCECD301929}"/>
+              </a:ext>
+            </a:extLst>
+          </p:cNvPr>
+          <p:cNvSpPr/>
+          <p:nvPr/>
+        </p:nvSpPr>
+        <p:spPr>
+          <a:xfrm>
+            <a:off x="697118" y="1358016"/>
+            <a:ext cx="1620569" cy="760491"/>
+          </a:xfrm>
+          <a:prstGeom prst="rect">
+            <a:avLst/>
+          </a:prstGeom>
+          <a:solidFill>
+            <a:schemeClr val="bg1"/>
+          </a:solidFill>
+          <a:ln>
+            <a:solidFill>
+              <a:schemeClr val="tx1"/>
+            </a:solidFill>
+          </a:ln>
+        </p:spPr>
+        <p:style>
+          <a:lnRef idx="2">
+            <a:schemeClr val="accent1">
+              <a:shade val="15000"/>
+            </a:schemeClr>
+          </a:lnRef>
+          <a:fillRef idx="1">
+            <a:schemeClr val="accent1"/>
+          </a:fillRef>
+          <a:effectRef idx="0">
+            <a:schemeClr val="accent1"/>
+          </a:effectRef>
+          <a:fontRef idx="minor">
+            <a:schemeClr val="lt1"/>
+          </a:fontRef>
+        </p:style>
+        <p:txBody>
+          <a:bodyPr rtlCol="0" anchor="ctr"/>
+          <a:lstStyle/>
+          <a:p>
+            <a:pPr algn="ctr"/>
+            <a:r>
+              <a:rPr lang="en-GB" sz="1200" dirty="0">
+                <a:solidFill>
+                  <a:schemeClr val="tx1"/>
+                </a:solidFill>
+              </a:rPr>
+              <a:t>Raw Audio Data sampled </a:t>
+            </a:r>
+            <a:r>
+              <a:rPr lang="en-GB" sz="1200">
+                <a:solidFill>
+                  <a:schemeClr val="tx1"/>
+                </a:solidFill>
+              </a:rPr>
+              <a:t>at 576kHz</a:t>
+            </a:r>
+            <a:endParaRPr lang="en-GB" sz="1200" dirty="0">
+              <a:solidFill>
+                <a:schemeClr val="tx1"/>
+              </a:solidFill>
+            </a:endParaRPr>
+          </a:p>
+        </p:txBody>
+      </p:sp>
+      <p:sp>
+        <p:nvSpPr>
+          <p:cNvPr id="6" name="Rectangle 5">
+            <a:extLst>
+              <a:ext uri="{FF2B5EF4-FFF2-40B4-BE49-F238E27FC236}">
+                <a16:creationId xmlns:a16="http://schemas.microsoft.com/office/drawing/2014/main" id="{A3BB2BD1-8608-B44D-2258-927F720394A1}"/>
+              </a:ext>
+            </a:extLst>
+          </p:cNvPr>
+          <p:cNvSpPr/>
+          <p:nvPr/>
+        </p:nvSpPr>
+        <p:spPr>
+          <a:xfrm>
+            <a:off x="2662475" y="1358016"/>
+            <a:ext cx="1429691" cy="760491"/>
+          </a:xfrm>
+          <a:prstGeom prst="rect">
+            <a:avLst/>
+          </a:prstGeom>
+          <a:solidFill>
+            <a:schemeClr val="bg1"/>
+          </a:solidFill>
+          <a:ln>
+            <a:solidFill>
+              <a:schemeClr val="tx1"/>
+            </a:solidFill>
+          </a:ln>
+        </p:spPr>
+        <p:style>
+          <a:lnRef idx="2">
+            <a:schemeClr val="accent1">
+              <a:shade val="15000"/>
+            </a:schemeClr>
+          </a:lnRef>
+          <a:fillRef idx="1">
+            <a:schemeClr val="accent1"/>
+          </a:fillRef>
+          <a:effectRef idx="0">
+            <a:schemeClr val="accent1"/>
+          </a:effectRef>
+          <a:fontRef idx="minor">
+            <a:schemeClr val="lt1"/>
+          </a:fontRef>
+        </p:style>
+        <p:txBody>
+          <a:bodyPr rtlCol="0" anchor="ctr"/>
+          <a:lstStyle/>
+          <a:p>
+            <a:pPr algn="ctr"/>
+            <a:r>
+              <a:rPr lang="en-GB" sz="1200" dirty="0">
+                <a:solidFill>
+                  <a:schemeClr val="tx1"/>
+                </a:solidFill>
+              </a:rPr>
+              <a:t>Automatic Click Detector</a:t>
+            </a:r>
+          </a:p>
+        </p:txBody>
+      </p:sp>
+      <p:sp>
+        <p:nvSpPr>
+          <p:cNvPr id="7" name="Rectangle 6">
+            <a:extLst>
+              <a:ext uri="{FF2B5EF4-FFF2-40B4-BE49-F238E27FC236}">
+                <a16:creationId xmlns:a16="http://schemas.microsoft.com/office/drawing/2014/main" id="{59B79942-3295-8422-7882-BC4C49E6EB82}"/>
+              </a:ext>
+            </a:extLst>
+          </p:cNvPr>
+          <p:cNvSpPr/>
+          <p:nvPr/>
+        </p:nvSpPr>
+        <p:spPr>
+          <a:xfrm>
+            <a:off x="4436955" y="1358016"/>
+            <a:ext cx="1311996" cy="760491"/>
+          </a:xfrm>
+          <a:prstGeom prst="rect">
+            <a:avLst/>
+          </a:prstGeom>
+          <a:solidFill>
+            <a:schemeClr val="bg1"/>
+          </a:solidFill>
+          <a:ln>
+            <a:solidFill>
+              <a:schemeClr val="tx1"/>
+            </a:solidFill>
+          </a:ln>
+        </p:spPr>
+        <p:style>
+          <a:lnRef idx="2">
+            <a:schemeClr val="accent1">
+              <a:shade val="15000"/>
+            </a:schemeClr>
+          </a:lnRef>
+          <a:fillRef idx="1">
+            <a:schemeClr val="accent1"/>
+          </a:fillRef>
+          <a:effectRef idx="0">
+            <a:schemeClr val="accent1"/>
+          </a:effectRef>
+          <a:fontRef idx="minor">
+            <a:schemeClr val="lt1"/>
+          </a:fontRef>
+        </p:style>
+        <p:txBody>
+          <a:bodyPr rtlCol="0" anchor="ctr"/>
+          <a:lstStyle/>
+          <a:p>
+            <a:pPr algn="ctr"/>
+            <a:r>
+              <a:rPr lang="en-GB" sz="1200" dirty="0">
+                <a:solidFill>
+                  <a:schemeClr val="tx1"/>
+                </a:solidFill>
+              </a:rPr>
+              <a:t>1ms clips of Transient Detections</a:t>
+            </a:r>
+          </a:p>
+        </p:txBody>
+      </p:sp>
+      <p:sp>
+        <p:nvSpPr>
+          <p:cNvPr id="8" name="Rectangle 7">
+            <a:extLst>
+              <a:ext uri="{FF2B5EF4-FFF2-40B4-BE49-F238E27FC236}">
+                <a16:creationId xmlns:a16="http://schemas.microsoft.com/office/drawing/2014/main" id="{D8506E66-B0D4-328A-48FF-3B77B62D2EB7}"/>
+              </a:ext>
+            </a:extLst>
+          </p:cNvPr>
+          <p:cNvSpPr/>
+          <p:nvPr/>
+        </p:nvSpPr>
+        <p:spPr>
+          <a:xfrm>
+            <a:off x="2692653" y="2311647"/>
+            <a:ext cx="1399513" cy="760491"/>
+          </a:xfrm>
+          <a:prstGeom prst="rect">
+            <a:avLst/>
+          </a:prstGeom>
+          <a:solidFill>
+            <a:schemeClr val="bg1"/>
+          </a:solidFill>
+          <a:ln>
+            <a:solidFill>
+              <a:schemeClr val="tx1"/>
+            </a:solidFill>
+          </a:ln>
+        </p:spPr>
+        <p:style>
+          <a:lnRef idx="2">
+            <a:schemeClr val="accent1">
+              <a:shade val="15000"/>
+            </a:schemeClr>
+          </a:lnRef>
+          <a:fillRef idx="1">
+            <a:schemeClr val="accent1"/>
+          </a:fillRef>
+          <a:effectRef idx="0">
+            <a:schemeClr val="accent1"/>
+          </a:effectRef>
+          <a:fontRef idx="minor">
+            <a:schemeClr val="lt1"/>
+          </a:fontRef>
+        </p:style>
+        <p:txBody>
+          <a:bodyPr rtlCol="0" anchor="ctr"/>
+          <a:lstStyle/>
+          <a:p>
+            <a:pPr algn="ctr"/>
+            <a:r>
+              <a:rPr lang="en-GB" sz="1200" dirty="0">
+                <a:solidFill>
+                  <a:schemeClr val="tx1"/>
+                </a:solidFill>
+              </a:rPr>
+              <a:t>Decimate to 96kHz</a:t>
+            </a:r>
+          </a:p>
+        </p:txBody>
+      </p:sp>
+      <p:sp>
+        <p:nvSpPr>
+          <p:cNvPr id="9" name="Rectangle 8">
+            <a:extLst>
+              <a:ext uri="{FF2B5EF4-FFF2-40B4-BE49-F238E27FC236}">
+                <a16:creationId xmlns:a16="http://schemas.microsoft.com/office/drawing/2014/main" id="{535566B5-5E07-D052-227E-AC65F5FEE321}"/>
+              </a:ext>
+            </a:extLst>
+          </p:cNvPr>
+          <p:cNvSpPr/>
+          <p:nvPr/>
+        </p:nvSpPr>
+        <p:spPr>
+          <a:xfrm>
+            <a:off x="4436956" y="2311647"/>
+            <a:ext cx="1311996" cy="760491"/>
+          </a:xfrm>
+          <a:prstGeom prst="rect">
+            <a:avLst/>
+          </a:prstGeom>
+          <a:solidFill>
+            <a:schemeClr val="bg1"/>
+          </a:solidFill>
+          <a:ln>
+            <a:solidFill>
+              <a:schemeClr val="tx1"/>
+            </a:solidFill>
+          </a:ln>
+        </p:spPr>
+        <p:style>
+          <a:lnRef idx="2">
+            <a:schemeClr val="accent1">
+              <a:shade val="15000"/>
+            </a:schemeClr>
+          </a:lnRef>
+          <a:fillRef idx="1">
+            <a:schemeClr val="accent1"/>
+          </a:fillRef>
+          <a:effectRef idx="0">
+            <a:schemeClr val="accent1"/>
+          </a:effectRef>
+          <a:fontRef idx="minor">
+            <a:schemeClr val="lt1"/>
+          </a:fontRef>
+        </p:style>
+        <p:txBody>
+          <a:bodyPr rtlCol="0" anchor="ctr"/>
+          <a:lstStyle/>
+          <a:p>
+            <a:pPr algn="ctr"/>
+            <a:r>
+              <a:rPr lang="en-GB" sz="1200" dirty="0">
+                <a:solidFill>
+                  <a:schemeClr val="tx1"/>
+                </a:solidFill>
+              </a:rPr>
+              <a:t>Recording 96kHz data</a:t>
+            </a:r>
+          </a:p>
+        </p:txBody>
+      </p:sp>
+      <p:sp>
+        <p:nvSpPr>
+          <p:cNvPr id="10" name="Rectangle 9">
+            <a:extLst>
+              <a:ext uri="{FF2B5EF4-FFF2-40B4-BE49-F238E27FC236}">
+                <a16:creationId xmlns:a16="http://schemas.microsoft.com/office/drawing/2014/main" id="{627D695E-DF02-230B-FFAF-A29F3F054223}"/>
+              </a:ext>
+            </a:extLst>
+          </p:cNvPr>
+          <p:cNvSpPr/>
+          <p:nvPr/>
+        </p:nvSpPr>
+        <p:spPr>
+          <a:xfrm>
+            <a:off x="6093740" y="1367066"/>
+            <a:ext cx="725787" cy="1714124"/>
+          </a:xfrm>
+          <a:prstGeom prst="rect">
+            <a:avLst/>
+          </a:prstGeom>
+          <a:solidFill>
+            <a:schemeClr val="bg1"/>
+          </a:solidFill>
+          <a:ln>
+            <a:solidFill>
+              <a:schemeClr val="tx1"/>
+            </a:solidFill>
+          </a:ln>
+        </p:spPr>
+        <p:style>
+          <a:lnRef idx="2">
+            <a:schemeClr val="accent1">
+              <a:shade val="15000"/>
+            </a:schemeClr>
+          </a:lnRef>
+          <a:fillRef idx="1">
+            <a:schemeClr val="accent1"/>
+          </a:fillRef>
+          <a:effectRef idx="0">
+            <a:schemeClr val="accent1"/>
+          </a:effectRef>
+          <a:fontRef idx="minor">
+            <a:schemeClr val="lt1"/>
+          </a:fontRef>
+        </p:style>
+        <p:txBody>
+          <a:bodyPr vert="vert270" rtlCol="0" anchor="ctr"/>
+          <a:lstStyle/>
+          <a:p>
+            <a:pPr algn="ctr"/>
+            <a:r>
+              <a:rPr lang="en-GB" sz="1200" dirty="0">
+                <a:solidFill>
+                  <a:schemeClr val="tx1"/>
+                </a:solidFill>
+              </a:rPr>
+              <a:t>Lossless Compression</a:t>
+            </a:r>
+          </a:p>
+        </p:txBody>
+      </p:sp>
+      <p:sp>
+        <p:nvSpPr>
+          <p:cNvPr id="11" name="Rectangle 10">
+            <a:extLst>
+              <a:ext uri="{FF2B5EF4-FFF2-40B4-BE49-F238E27FC236}">
+                <a16:creationId xmlns:a16="http://schemas.microsoft.com/office/drawing/2014/main" id="{A58E61AB-85A4-B9AC-337B-0A5C91CA4CB2}"/>
+              </a:ext>
+            </a:extLst>
+          </p:cNvPr>
+          <p:cNvSpPr/>
+          <p:nvPr/>
+        </p:nvSpPr>
+        <p:spPr>
+          <a:xfrm>
+            <a:off x="7142432" y="1376118"/>
+            <a:ext cx="725787" cy="1714125"/>
+          </a:xfrm>
+          <a:prstGeom prst="rect">
+            <a:avLst/>
+          </a:prstGeom>
+          <a:solidFill>
+            <a:schemeClr val="bg1"/>
+          </a:solidFill>
+          <a:ln>
+            <a:solidFill>
+              <a:schemeClr val="tx1"/>
+            </a:solidFill>
+          </a:ln>
+        </p:spPr>
+        <p:style>
+          <a:lnRef idx="2">
+            <a:schemeClr val="accent1">
+              <a:shade val="15000"/>
+            </a:schemeClr>
+          </a:lnRef>
+          <a:fillRef idx="1">
+            <a:schemeClr val="accent1"/>
+          </a:fillRef>
+          <a:effectRef idx="0">
+            <a:schemeClr val="accent1"/>
+          </a:effectRef>
+          <a:fontRef idx="minor">
+            <a:schemeClr val="lt1"/>
+          </a:fontRef>
+        </p:style>
+        <p:txBody>
+          <a:bodyPr vert="vert270" rtlCol="0" anchor="ctr"/>
+          <a:lstStyle/>
+          <a:p>
+            <a:pPr algn="ctr"/>
+            <a:r>
+              <a:rPr lang="en-GB" sz="1200" dirty="0">
+                <a:solidFill>
+                  <a:schemeClr val="tx1"/>
+                </a:solidFill>
+              </a:rPr>
+              <a:t>SUD File Storage</a:t>
+            </a:r>
+          </a:p>
+        </p:txBody>
+      </p:sp>
+      <p:cxnSp>
+        <p:nvCxnSpPr>
+          <p:cNvPr id="13" name="Connector: Elbow 12">
+            <a:extLst>
+              <a:ext uri="{FF2B5EF4-FFF2-40B4-BE49-F238E27FC236}">
+                <a16:creationId xmlns:a16="http://schemas.microsoft.com/office/drawing/2014/main" id="{23C32073-BBE1-2794-38BF-20B05C440E0B}"/>
+              </a:ext>
+            </a:extLst>
+          </p:cNvPr>
+          <p:cNvCxnSpPr>
+            <a:cxnSpLocks/>
+          </p:cNvCxnSpPr>
+          <p:nvPr/>
+        </p:nvCxnSpPr>
+        <p:spPr>
+          <a:xfrm>
+            <a:off x="2317687" y="1731911"/>
+            <a:ext cx="344788" cy="12700"/>
+          </a:xfrm>
+          <a:prstGeom prst="bentConnector3">
+            <a:avLst/>
+          </a:prstGeom>
+          <a:ln>
+            <a:solidFill>
+              <a:schemeClr val="tx1"/>
+            </a:solidFill>
+            <a:tailEnd type="triangle"/>
+          </a:ln>
+        </p:spPr>
+        <p:style>
+          <a:lnRef idx="2">
+            <a:schemeClr val="accent1"/>
+          </a:lnRef>
+          <a:fillRef idx="0">
+            <a:schemeClr val="accent1"/>
+          </a:fillRef>
+          <a:effectRef idx="1">
+            <a:schemeClr val="accent1"/>
+          </a:effectRef>
+          <a:fontRef idx="minor">
+            <a:schemeClr val="tx1"/>
+          </a:fontRef>
+        </p:style>
+      </p:cxnSp>
+      <p:cxnSp>
+        <p:nvCxnSpPr>
+          <p:cNvPr id="14" name="Connector: Elbow 13">
+            <a:extLst>
+              <a:ext uri="{FF2B5EF4-FFF2-40B4-BE49-F238E27FC236}">
+                <a16:creationId xmlns:a16="http://schemas.microsoft.com/office/drawing/2014/main" id="{FC33CACE-8736-7545-A1FC-C56AC37E8FE2}"/>
+              </a:ext>
+            </a:extLst>
+          </p:cNvPr>
+          <p:cNvCxnSpPr>
+            <a:cxnSpLocks/>
+            <a:stCxn id="6" idx="3"/>
+            <a:endCxn id="7" idx="1"/>
+          </p:cNvCxnSpPr>
+          <p:nvPr/>
+        </p:nvCxnSpPr>
+        <p:spPr>
+          <a:xfrm>
+            <a:off x="4092166" y="1738262"/>
+            <a:ext cx="344789" cy="12700"/>
+          </a:xfrm>
+          <a:prstGeom prst="bentConnector3">
+            <a:avLst>
+              <a:gd name="adj1" fmla="val 50000"/>
+            </a:avLst>
+          </a:prstGeom>
+          <a:ln>
+            <a:solidFill>
+              <a:schemeClr val="tx1"/>
+            </a:solidFill>
+            <a:tailEnd type="triangle"/>
+          </a:ln>
+        </p:spPr>
+        <p:style>
+          <a:lnRef idx="2">
+            <a:schemeClr val="accent1"/>
+          </a:lnRef>
+          <a:fillRef idx="0">
+            <a:schemeClr val="accent1"/>
+          </a:fillRef>
+          <a:effectRef idx="1">
+            <a:schemeClr val="accent1"/>
+          </a:effectRef>
+          <a:fontRef idx="minor">
+            <a:schemeClr val="tx1"/>
+          </a:fontRef>
+        </p:style>
+      </p:cxnSp>
+      <p:cxnSp>
+        <p:nvCxnSpPr>
+          <p:cNvPr id="15" name="Connector: Elbow 14">
+            <a:extLst>
+              <a:ext uri="{FF2B5EF4-FFF2-40B4-BE49-F238E27FC236}">
+                <a16:creationId xmlns:a16="http://schemas.microsoft.com/office/drawing/2014/main" id="{53F4A7CB-0B0B-F53E-D7FA-1CDAA865D0CE}"/>
+              </a:ext>
+            </a:extLst>
+          </p:cNvPr>
+          <p:cNvCxnSpPr>
+            <a:cxnSpLocks/>
+            <a:stCxn id="5" idx="3"/>
+            <a:endCxn id="8" idx="1"/>
+          </p:cNvCxnSpPr>
+          <p:nvPr/>
+        </p:nvCxnSpPr>
+        <p:spPr>
+          <a:xfrm>
+            <a:off x="2317687" y="1738262"/>
+            <a:ext cx="374966" cy="953631"/>
+          </a:xfrm>
+          <a:prstGeom prst="bentConnector3">
+            <a:avLst/>
+          </a:prstGeom>
+          <a:ln>
+            <a:solidFill>
+              <a:schemeClr val="tx1"/>
+            </a:solidFill>
+            <a:tailEnd type="triangle"/>
+          </a:ln>
+        </p:spPr>
+        <p:style>
+          <a:lnRef idx="2">
+            <a:schemeClr val="accent1"/>
+          </a:lnRef>
+          <a:fillRef idx="0">
+            <a:schemeClr val="accent1"/>
+          </a:fillRef>
+          <a:effectRef idx="1">
+            <a:schemeClr val="accent1"/>
+          </a:effectRef>
+          <a:fontRef idx="minor">
+            <a:schemeClr val="tx1"/>
+          </a:fontRef>
+        </p:style>
+      </p:cxnSp>
+      <p:cxnSp>
+        <p:nvCxnSpPr>
+          <p:cNvPr id="16" name="Connector: Elbow 15">
+            <a:extLst>
+              <a:ext uri="{FF2B5EF4-FFF2-40B4-BE49-F238E27FC236}">
+                <a16:creationId xmlns:a16="http://schemas.microsoft.com/office/drawing/2014/main" id="{6F6FA5E7-E31B-F26C-5D4B-95421B84AC21}"/>
+              </a:ext>
+            </a:extLst>
+          </p:cNvPr>
+          <p:cNvCxnSpPr>
+            <a:cxnSpLocks/>
+            <a:stCxn id="8" idx="3"/>
+            <a:endCxn id="9" idx="1"/>
+          </p:cNvCxnSpPr>
+          <p:nvPr/>
+        </p:nvCxnSpPr>
+        <p:spPr>
+          <a:xfrm>
+            <a:off x="4092166" y="2691893"/>
+            <a:ext cx="344790" cy="12700"/>
+          </a:xfrm>
+          <a:prstGeom prst="bentConnector3">
+            <a:avLst/>
+          </a:prstGeom>
+          <a:ln>
+            <a:solidFill>
+              <a:schemeClr val="tx1"/>
+            </a:solidFill>
+            <a:tailEnd type="triangle"/>
+          </a:ln>
+        </p:spPr>
+        <p:style>
+          <a:lnRef idx="2">
+            <a:schemeClr val="accent1"/>
+          </a:lnRef>
+          <a:fillRef idx="0">
+            <a:schemeClr val="accent1"/>
+          </a:fillRef>
+          <a:effectRef idx="1">
+            <a:schemeClr val="accent1"/>
+          </a:effectRef>
+          <a:fontRef idx="minor">
+            <a:schemeClr val="tx1"/>
+          </a:fontRef>
+        </p:style>
+      </p:cxnSp>
+      <p:cxnSp>
+        <p:nvCxnSpPr>
+          <p:cNvPr id="17" name="Connector: Elbow 16">
+            <a:extLst>
+              <a:ext uri="{FF2B5EF4-FFF2-40B4-BE49-F238E27FC236}">
+                <a16:creationId xmlns:a16="http://schemas.microsoft.com/office/drawing/2014/main" id="{D342DAC7-7EC0-939A-AE7D-DC86CA19C828}"/>
+              </a:ext>
+            </a:extLst>
+          </p:cNvPr>
+          <p:cNvCxnSpPr>
+            <a:cxnSpLocks/>
+            <a:stCxn id="7" idx="3"/>
+            <a:endCxn id="10" idx="1"/>
+          </p:cNvCxnSpPr>
+          <p:nvPr/>
+        </p:nvCxnSpPr>
+        <p:spPr>
+          <a:xfrm>
+            <a:off x="5748951" y="1738262"/>
+            <a:ext cx="344789" cy="485866"/>
+          </a:xfrm>
+          <a:prstGeom prst="bentConnector3">
+            <a:avLst/>
+          </a:prstGeom>
+          <a:ln>
+            <a:solidFill>
+              <a:schemeClr val="tx1"/>
+            </a:solidFill>
+            <a:tailEnd type="triangle"/>
+          </a:ln>
+        </p:spPr>
+        <p:style>
+          <a:lnRef idx="2">
+            <a:schemeClr val="accent1"/>
+          </a:lnRef>
+          <a:fillRef idx="0">
+            <a:schemeClr val="accent1"/>
+          </a:fillRef>
+          <a:effectRef idx="1">
+            <a:schemeClr val="accent1"/>
+          </a:effectRef>
+          <a:fontRef idx="minor">
+            <a:schemeClr val="tx1"/>
+          </a:fontRef>
+        </p:style>
+      </p:cxnSp>
+      <p:cxnSp>
+        <p:nvCxnSpPr>
+          <p:cNvPr id="27" name="Connector: Elbow 26">
+            <a:extLst>
+              <a:ext uri="{FF2B5EF4-FFF2-40B4-BE49-F238E27FC236}">
+                <a16:creationId xmlns:a16="http://schemas.microsoft.com/office/drawing/2014/main" id="{80ED5659-8391-D3E2-05C1-89C2103D0E9D}"/>
+              </a:ext>
+            </a:extLst>
+          </p:cNvPr>
+          <p:cNvCxnSpPr>
+            <a:cxnSpLocks/>
+            <a:stCxn id="9" idx="3"/>
+            <a:endCxn id="10" idx="1"/>
+          </p:cNvCxnSpPr>
+          <p:nvPr/>
+        </p:nvCxnSpPr>
+        <p:spPr>
+          <a:xfrm flipV="1">
+            <a:off x="5748952" y="2224128"/>
+            <a:ext cx="344788" cy="467765"/>
+          </a:xfrm>
+          <a:prstGeom prst="bentConnector3">
+            <a:avLst>
+              <a:gd name="adj1" fmla="val 50000"/>
+            </a:avLst>
+          </a:prstGeom>
+          <a:ln>
+            <a:solidFill>
+              <a:schemeClr val="tx1"/>
+            </a:solidFill>
+            <a:tailEnd type="triangle"/>
+          </a:ln>
+        </p:spPr>
+        <p:style>
+          <a:lnRef idx="2">
+            <a:schemeClr val="accent1"/>
+          </a:lnRef>
+          <a:fillRef idx="0">
+            <a:schemeClr val="accent1"/>
+          </a:fillRef>
+          <a:effectRef idx="1">
+            <a:schemeClr val="accent1"/>
+          </a:effectRef>
+          <a:fontRef idx="minor">
+            <a:schemeClr val="tx1"/>
+          </a:fontRef>
+        </p:style>
+      </p:cxnSp>
+      <p:cxnSp>
+        <p:nvCxnSpPr>
+          <p:cNvPr id="31" name="Connector: Elbow 30">
+            <a:extLst>
+              <a:ext uri="{FF2B5EF4-FFF2-40B4-BE49-F238E27FC236}">
+                <a16:creationId xmlns:a16="http://schemas.microsoft.com/office/drawing/2014/main" id="{9B83FAC2-B0A6-C8DD-838A-EE7732190536}"/>
+              </a:ext>
+            </a:extLst>
+          </p:cNvPr>
+          <p:cNvCxnSpPr>
+            <a:cxnSpLocks/>
+            <a:stCxn id="10" idx="3"/>
+            <a:endCxn id="11" idx="1"/>
+          </p:cNvCxnSpPr>
+          <p:nvPr/>
+        </p:nvCxnSpPr>
+        <p:spPr>
+          <a:xfrm>
+            <a:off x="6819527" y="2224128"/>
+            <a:ext cx="322905" cy="9053"/>
+          </a:xfrm>
+          <a:prstGeom prst="bentConnector3">
+            <a:avLst>
+              <a:gd name="adj1" fmla="val 50000"/>
+            </a:avLst>
+          </a:prstGeom>
+          <a:ln>
+            <a:solidFill>
+              <a:schemeClr val="tx1"/>
+            </a:solidFill>
+            <a:tailEnd type="triangle"/>
+          </a:ln>
+        </p:spPr>
+        <p:style>
+          <a:lnRef idx="2">
+            <a:schemeClr val="accent1"/>
+          </a:lnRef>
+          <a:fillRef idx="0">
+            <a:schemeClr val="accent1"/>
+          </a:fillRef>
+          <a:effectRef idx="1">
+            <a:schemeClr val="accent1"/>
+          </a:effectRef>
+          <a:fontRef idx="minor">
+            <a:schemeClr val="tx1"/>
+          </a:fontRef>
+        </p:style>
+      </p:cxnSp>
+      <p:pic>
+        <p:nvPicPr>
+          <p:cNvPr id="3" name="Picture 2" descr="A white device with a black handle&#10;&#10;Description automatically generated">
+            <a:extLst>
+              <a:ext uri="{FF2B5EF4-FFF2-40B4-BE49-F238E27FC236}">
+                <a16:creationId xmlns:a16="http://schemas.microsoft.com/office/drawing/2014/main" id="{8BC1E203-DDEA-A6D6-91E8-2B0FDCABB686}"/>
+              </a:ext>
+            </a:extLst>
+          </p:cNvPr>
+          <p:cNvPicPr>
+            <a:picLocks noChangeAspect="1"/>
+          </p:cNvPicPr>
+          <p:nvPr/>
+        </p:nvPicPr>
+        <p:blipFill>
+          <a:blip r:embed="rId2">
+            <a:extLst>
+              <a:ext uri="{28A0092B-C50C-407E-A947-70E740481C1C}">
+                <a14:useLocalDpi xmlns:a14="http://schemas.microsoft.com/office/drawing/2010/main" val="0"/>
+              </a:ext>
+            </a:extLst>
+          </a:blip>
+          <a:srcRect l="32644" t="9621" r="40478" b="3597"/>
+          <a:stretch/>
+        </p:blipFill>
+        <p:spPr>
+          <a:xfrm rot="5400000">
+            <a:off x="3858546" y="-411834"/>
+            <a:ext cx="812029" cy="2547232"/>
+          </a:xfrm>
+          <a:prstGeom prst="rect">
+            <a:avLst/>
+          </a:prstGeom>
+        </p:spPr>
+      </p:pic>
+    </p:spTree>
+    <p:extLst>
+      <p:ext uri="{BB962C8B-B14F-4D97-AF65-F5344CB8AC3E}">
+        <p14:creationId xmlns:p14="http://schemas.microsoft.com/office/powerpoint/2010/main" val="2558520134"/>
+      </p:ext>
+    </p:extLst>
+  </p:cSld>
+  <p:clrMapOvr>
+    <a:masterClrMapping/>
+  </p:clrMapOvr>
+</p:sld>
+</file>
+
+<file path=ppt/slides/slide6.xml><?xml version="1.0" encoding="utf-8"?>
+<p:sld xmlns:a="http://schemas.openxmlformats.org/drawingml/2006/main" xmlns:r="http://schemas.openxmlformats.org/officeDocument/2006/relationships" xmlns:p="http://schemas.openxmlformats.org/presentationml/2006/main">
+  <p:cSld>
+    <p:spTree>
+      <p:nvGrpSpPr>
+        <p:cNvPr id="1" name=""/>
+        <p:cNvGrpSpPr/>
+        <p:nvPr/>
+      </p:nvGrpSpPr>
+      <p:grpSpPr>
+        <a:xfrm>
+          <a:off x="0" y="0"/>
+          <a:ext cx="0" cy="0"/>
+          <a:chOff x="0" y="0"/>
+          <a:chExt cx="0" cy="0"/>
+        </a:xfrm>
+      </p:grpSpPr>
+      <p:sp>
+        <p:nvSpPr>
+          <p:cNvPr id="2" name="Title 1">
+            <a:extLst>
+              <a:ext uri="{FF2B5EF4-FFF2-40B4-BE49-F238E27FC236}">
+                <a16:creationId xmlns:a16="http://schemas.microsoft.com/office/drawing/2014/main" id="{BD50774B-943A-2B78-A4F5-E0291E359727}"/>
+              </a:ext>
+            </a:extLst>
+          </p:cNvPr>
+          <p:cNvSpPr>
+            <a:spLocks noGrp="1"/>
+          </p:cNvSpPr>
+          <p:nvPr>
+            <p:ph type="title"/>
+          </p:nvPr>
+        </p:nvSpPr>
+        <p:spPr/>
+        <p:txBody>
+          <a:bodyPr/>
+          <a:lstStyle/>
+          <a:p>
+            <a:endParaRPr lang="en-GB"/>
+          </a:p>
+        </p:txBody>
+      </p:sp>
+      <p:sp>
+        <p:nvSpPr>
+          <p:cNvPr id="3" name="Content Placeholder 2">
+            <a:extLst>
+              <a:ext uri="{FF2B5EF4-FFF2-40B4-BE49-F238E27FC236}">
+                <a16:creationId xmlns:a16="http://schemas.microsoft.com/office/drawing/2014/main" id="{9E0A443B-BADC-02E1-8B76-BB5AD7032C46}"/>
+              </a:ext>
+            </a:extLst>
+          </p:cNvPr>
+          <p:cNvSpPr>
+            <a:spLocks noGrp="1"/>
+          </p:cNvSpPr>
+          <p:nvPr>
+            <p:ph idx="1"/>
+          </p:nvPr>
+        </p:nvSpPr>
+        <p:spPr/>
+        <p:txBody>
+          <a:bodyPr/>
+          <a:lstStyle/>
+          <a:p>
+            <a:endParaRPr lang="en-GB"/>
+          </a:p>
+        </p:txBody>
+      </p:sp>
+    </p:spTree>
+    <p:extLst>
+      <p:ext uri="{BB962C8B-B14F-4D97-AF65-F5344CB8AC3E}">
+        <p14:creationId xmlns:p14="http://schemas.microsoft.com/office/powerpoint/2010/main" val="2969955"/>
       </p:ext>
     </p:extLst>
   </p:cSld>

</xml_diff>